<commit_message>
Updated the report and presentation
</commit_message>
<xml_diff>
--- a/Report_Presentation/Presentation.pptx
+++ b/Report_Presentation/Presentation.pptx
@@ -19,12 +19,15 @@
     <p:sldId id="264" r:id="rId13"/>
     <p:sldId id="265" r:id="rId14"/>
     <p:sldId id="266" r:id="rId15"/>
-    <p:sldId id="267" r:id="rId16"/>
-    <p:sldId id="278" r:id="rId17"/>
-    <p:sldId id="268" r:id="rId18"/>
-    <p:sldId id="273" r:id="rId19"/>
-    <p:sldId id="279" r:id="rId20"/>
-    <p:sldId id="270" r:id="rId21"/>
+    <p:sldId id="280" r:id="rId16"/>
+    <p:sldId id="282" r:id="rId17"/>
+    <p:sldId id="281" r:id="rId18"/>
+    <p:sldId id="267" r:id="rId19"/>
+    <p:sldId id="278" r:id="rId20"/>
+    <p:sldId id="268" r:id="rId21"/>
+    <p:sldId id="273" r:id="rId22"/>
+    <p:sldId id="279" r:id="rId23"/>
+    <p:sldId id="270" r:id="rId24"/>
   </p:sldIdLst>
   <p:sldSz cx="12192000" cy="6858000"/>
   <p:notesSz cx="6858000" cy="9144000"/>
@@ -280,7 +283,7 @@
           <a:p>
             <a:fld id="{EA4AD591-6FE7-B041-9C7C-00391B3566DD}" type="datetimeFigureOut">
               <a:rPr lang="en-CH" smtClean="0"/>
-              <a:t>26.05.20</a:t>
+              <a:t>27.05.20</a:t>
             </a:fld>
             <a:endParaRPr lang="en-CH"/>
           </a:p>
@@ -480,7 +483,7 @@
           <a:p>
             <a:fld id="{EA4AD591-6FE7-B041-9C7C-00391B3566DD}" type="datetimeFigureOut">
               <a:rPr lang="en-CH" smtClean="0"/>
-              <a:t>26.05.20</a:t>
+              <a:t>27.05.20</a:t>
             </a:fld>
             <a:endParaRPr lang="en-CH"/>
           </a:p>
@@ -690,7 +693,7 @@
           <a:p>
             <a:fld id="{EA4AD591-6FE7-B041-9C7C-00391B3566DD}" type="datetimeFigureOut">
               <a:rPr lang="en-CH" smtClean="0"/>
-              <a:t>26.05.20</a:t>
+              <a:t>27.05.20</a:t>
             </a:fld>
             <a:endParaRPr lang="en-CH"/>
           </a:p>
@@ -890,7 +893,7 @@
           <a:p>
             <a:fld id="{EA4AD591-6FE7-B041-9C7C-00391B3566DD}" type="datetimeFigureOut">
               <a:rPr lang="en-CH" smtClean="0"/>
-              <a:t>26.05.20</a:t>
+              <a:t>27.05.20</a:t>
             </a:fld>
             <a:endParaRPr lang="en-CH"/>
           </a:p>
@@ -1166,7 +1169,7 @@
           <a:p>
             <a:fld id="{EA4AD591-6FE7-B041-9C7C-00391B3566DD}" type="datetimeFigureOut">
               <a:rPr lang="en-CH" smtClean="0"/>
-              <a:t>26.05.20</a:t>
+              <a:t>27.05.20</a:t>
             </a:fld>
             <a:endParaRPr lang="en-CH"/>
           </a:p>
@@ -1434,7 +1437,7 @@
           <a:p>
             <a:fld id="{EA4AD591-6FE7-B041-9C7C-00391B3566DD}" type="datetimeFigureOut">
               <a:rPr lang="en-CH" smtClean="0"/>
-              <a:t>26.05.20</a:t>
+              <a:t>27.05.20</a:t>
             </a:fld>
             <a:endParaRPr lang="en-CH"/>
           </a:p>
@@ -1849,7 +1852,7 @@
           <a:p>
             <a:fld id="{EA4AD591-6FE7-B041-9C7C-00391B3566DD}" type="datetimeFigureOut">
               <a:rPr lang="en-CH" smtClean="0"/>
-              <a:t>26.05.20</a:t>
+              <a:t>27.05.20</a:t>
             </a:fld>
             <a:endParaRPr lang="en-CH"/>
           </a:p>
@@ -1991,7 +1994,7 @@
           <a:p>
             <a:fld id="{EA4AD591-6FE7-B041-9C7C-00391B3566DD}" type="datetimeFigureOut">
               <a:rPr lang="en-CH" smtClean="0"/>
-              <a:t>26.05.20</a:t>
+              <a:t>27.05.20</a:t>
             </a:fld>
             <a:endParaRPr lang="en-CH"/>
           </a:p>
@@ -2104,7 +2107,7 @@
           <a:p>
             <a:fld id="{EA4AD591-6FE7-B041-9C7C-00391B3566DD}" type="datetimeFigureOut">
               <a:rPr lang="en-CH" smtClean="0"/>
-              <a:t>26.05.20</a:t>
+              <a:t>27.05.20</a:t>
             </a:fld>
             <a:endParaRPr lang="en-CH"/>
           </a:p>
@@ -2417,7 +2420,7 @@
           <a:p>
             <a:fld id="{EA4AD591-6FE7-B041-9C7C-00391B3566DD}" type="datetimeFigureOut">
               <a:rPr lang="en-CH" smtClean="0"/>
-              <a:t>26.05.20</a:t>
+              <a:t>27.05.20</a:t>
             </a:fld>
             <a:endParaRPr lang="en-CH"/>
           </a:p>
@@ -2706,7 +2709,7 @@
           <a:p>
             <a:fld id="{EA4AD591-6FE7-B041-9C7C-00391B3566DD}" type="datetimeFigureOut">
               <a:rPr lang="en-CH" smtClean="0"/>
-              <a:t>26.05.20</a:t>
+              <a:t>27.05.20</a:t>
             </a:fld>
             <a:endParaRPr lang="en-CH"/>
           </a:p>
@@ -2949,7 +2952,7 @@
           <a:p>
             <a:fld id="{EA4AD591-6FE7-B041-9C7C-00391B3566DD}" type="datetimeFigureOut">
               <a:rPr lang="en-CH" smtClean="0"/>
-              <a:t>26.05.20</a:t>
+              <a:t>27.05.20</a:t>
             </a:fld>
             <a:endParaRPr lang="en-CH"/>
           </a:p>
@@ -4441,7 +4444,7 @@
           <a:p>
             <a:r>
               <a:rPr lang="en-US" dirty="0"/>
-              <a:t>This digital signal is saved in the memory until 125 signals are formed then fed to the ML model to predict the patient’s disease status. </a:t>
+              <a:t>This digital sample is processed, saved in the memory until 125 signals are formed then fed to the ML model to predict the patient’s disease status. </a:t>
             </a:r>
           </a:p>
           <a:p>
@@ -4479,6 +4482,476 @@
 </file>
 
 <file path=ppt/slides/slide15.xml><?xml version="1.0" encoding="utf-8"?>
+<p:sld xmlns:a="http://schemas.openxmlformats.org/drawingml/2006/main" xmlns:r="http://schemas.openxmlformats.org/officeDocument/2006/relationships" xmlns:p="http://schemas.openxmlformats.org/presentationml/2006/main">
+  <p:cSld>
+    <p:spTree>
+      <p:nvGrpSpPr>
+        <p:cNvPr id="1" name=""/>
+        <p:cNvGrpSpPr/>
+        <p:nvPr/>
+      </p:nvGrpSpPr>
+      <p:grpSpPr>
+        <a:xfrm>
+          <a:off x="0" y="0"/>
+          <a:ext cx="0" cy="0"/>
+          <a:chOff x="0" y="0"/>
+          <a:chExt cx="0" cy="0"/>
+        </a:xfrm>
+      </p:grpSpPr>
+      <p:sp>
+        <p:nvSpPr>
+          <p:cNvPr id="2" name="Title 1">
+            <a:extLst>
+              <a:ext uri="{FF2B5EF4-FFF2-40B4-BE49-F238E27FC236}">
+                <a16:creationId xmlns:a16="http://schemas.microsoft.com/office/drawing/2014/main" id="{EDFA42DC-A83C-6244-ACB0-DB76CDC42B5A}"/>
+              </a:ext>
+            </a:extLst>
+          </p:cNvPr>
+          <p:cNvSpPr>
+            <a:spLocks noGrp="1"/>
+          </p:cNvSpPr>
+          <p:nvPr>
+            <p:ph type="title"/>
+          </p:nvPr>
+        </p:nvSpPr>
+        <p:spPr/>
+        <p:txBody>
+          <a:bodyPr/>
+          <a:lstStyle/>
+          <a:p>
+            <a:r>
+              <a:rPr lang="en-CH" dirty="0"/>
+              <a:t>Authors Signal Preprocessing*</a:t>
+            </a:r>
+          </a:p>
+        </p:txBody>
+      </p:sp>
+      <p:sp>
+        <p:nvSpPr>
+          <p:cNvPr id="3" name="Content Placeholder 2">
+            <a:extLst>
+              <a:ext uri="{FF2B5EF4-FFF2-40B4-BE49-F238E27FC236}">
+                <a16:creationId xmlns:a16="http://schemas.microsoft.com/office/drawing/2014/main" id="{79A36AC7-A53F-9643-86E9-9737FFA38AEE}"/>
+              </a:ext>
+            </a:extLst>
+          </p:cNvPr>
+          <p:cNvSpPr>
+            <a:spLocks noGrp="1"/>
+          </p:cNvSpPr>
+          <p:nvPr>
+            <p:ph idx="1"/>
+          </p:nvPr>
+        </p:nvSpPr>
+        <p:spPr/>
+        <p:txBody>
+          <a:bodyPr>
+            <a:normAutofit fontScale="92500" lnSpcReduction="20000"/>
+          </a:bodyPr>
+          <a:lstStyle/>
+          <a:p>
+            <a:pPr marL="0" indent="0">
+              <a:buNone/>
+            </a:pPr>
+            <a:r>
+              <a:rPr lang="en-CH" dirty="0"/>
+              <a:t>1) Splitting the continuous ECG signal to 10s windows and select a 10s window from an ECG signal. </a:t>
+            </a:r>
+          </a:p>
+          <a:p>
+            <a:pPr marL="0" indent="0">
+              <a:buNone/>
+            </a:pPr>
+            <a:r>
+              <a:rPr lang="en-CH" dirty="0"/>
+              <a:t>2) Normalizing the amplitude values to the range of between zero and one. </a:t>
+            </a:r>
+          </a:p>
+          <a:p>
+            <a:pPr marL="0" indent="0">
+              <a:buNone/>
+            </a:pPr>
+            <a:r>
+              <a:rPr lang="en-CH" dirty="0"/>
+              <a:t>3) Finding the set of all local maximums based on zerocrossings of the first derivative. </a:t>
+            </a:r>
+          </a:p>
+          <a:p>
+            <a:pPr marL="0" indent="0">
+              <a:buNone/>
+            </a:pPr>
+            <a:r>
+              <a:rPr lang="en-CH" dirty="0"/>
+              <a:t>4) Finding the set of ECG R-peak candidates by applying a threshold of 0.9 on the normalized value of the local maximums. </a:t>
+            </a:r>
+          </a:p>
+          <a:p>
+            <a:pPr marL="0" indent="0">
+              <a:buNone/>
+            </a:pPr>
+            <a:r>
+              <a:rPr lang="en-CH" dirty="0"/>
+              <a:t>5) Finding the median of R-R time intervals as the nominal heartbeat period of that window (T). </a:t>
+            </a:r>
+          </a:p>
+          <a:p>
+            <a:pPr marL="0" indent="0">
+              <a:buNone/>
+            </a:pPr>
+            <a:r>
+              <a:rPr lang="en-CH" dirty="0"/>
+              <a:t>6) For each R-peak, selecting a signal part with the length equal to 1.2T. </a:t>
+            </a:r>
+          </a:p>
+          <a:p>
+            <a:pPr marL="0" indent="0">
+              <a:buNone/>
+            </a:pPr>
+            <a:r>
+              <a:rPr lang="en-CH" dirty="0"/>
+              <a:t>7) Padding each selected part with zeros to make its length equal to a predefined fixed length.</a:t>
+            </a:r>
+          </a:p>
+          <a:p>
+            <a:endParaRPr lang="en-CH" dirty="0"/>
+          </a:p>
+        </p:txBody>
+      </p:sp>
+      <p:sp>
+        <p:nvSpPr>
+          <p:cNvPr id="4" name="TextBox 3">
+            <a:extLst>
+              <a:ext uri="{FF2B5EF4-FFF2-40B4-BE49-F238E27FC236}">
+                <a16:creationId xmlns:a16="http://schemas.microsoft.com/office/drawing/2014/main" id="{DE4B8189-D714-DE46-9A6B-C900C1DA689B}"/>
+              </a:ext>
+            </a:extLst>
+          </p:cNvPr>
+          <p:cNvSpPr txBox="1"/>
+          <p:nvPr/>
+        </p:nvSpPr>
+        <p:spPr>
+          <a:xfrm>
+            <a:off x="0" y="6211669"/>
+            <a:ext cx="8229600" cy="646331"/>
+          </a:xfrm>
+          <a:prstGeom prst="rect">
+            <a:avLst/>
+          </a:prstGeom>
+          <a:noFill/>
+        </p:spPr>
+        <p:txBody>
+          <a:bodyPr wrap="square" rtlCol="0">
+            <a:spAutoFit/>
+          </a:bodyPr>
+          <a:lstStyle/>
+          <a:p>
+            <a:r>
+              <a:rPr lang="en-CH" dirty="0"/>
+              <a:t>*</a:t>
+            </a:r>
+            <a:r>
+              <a:rPr lang="en-CH" b="1" dirty="0"/>
+              <a:t>ECG Heartbeat Classification: A Deep Transferable Representation</a:t>
+            </a:r>
+            <a:r>
+              <a:rPr lang="en-US" b="1" dirty="0"/>
+              <a:t>, by </a:t>
+            </a:r>
+            <a:r>
+              <a:rPr lang="en-CH" b="1" u="sng" dirty="0">
+                <a:hlinkClick r:id="rId2"/>
+              </a:rPr>
+              <a:t>Mohammad Kachuee</a:t>
+            </a:r>
+            <a:r>
+              <a:rPr lang="en-CH" b="1" dirty="0"/>
+              <a:t>, </a:t>
+            </a:r>
+            <a:r>
+              <a:rPr lang="en-CH" b="1" u="sng" dirty="0">
+                <a:hlinkClick r:id="rId3"/>
+              </a:rPr>
+              <a:t>Shayan Fazeli</a:t>
+            </a:r>
+            <a:r>
+              <a:rPr lang="en-CH" b="1" dirty="0"/>
+              <a:t>, </a:t>
+            </a:r>
+            <a:r>
+              <a:rPr lang="en-CH" b="1" u="sng" dirty="0">
+                <a:hlinkClick r:id="rId4"/>
+              </a:rPr>
+              <a:t>Majid Sarrafzadeh</a:t>
+            </a:r>
+            <a:endParaRPr lang="en-CH" dirty="0"/>
+          </a:p>
+        </p:txBody>
+      </p:sp>
+    </p:spTree>
+    <p:extLst>
+      <p:ext uri="{BB962C8B-B14F-4D97-AF65-F5344CB8AC3E}">
+        <p14:creationId xmlns:p14="http://schemas.microsoft.com/office/powerpoint/2010/main" val="3753105727"/>
+      </p:ext>
+    </p:extLst>
+  </p:cSld>
+  <p:clrMapOvr>
+    <a:masterClrMapping/>
+  </p:clrMapOvr>
+</p:sld>
+</file>
+
+<file path=ppt/slides/slide16.xml><?xml version="1.0" encoding="utf-8"?>
+<p:sld xmlns:a="http://schemas.openxmlformats.org/drawingml/2006/main" xmlns:r="http://schemas.openxmlformats.org/officeDocument/2006/relationships" xmlns:p="http://schemas.openxmlformats.org/presentationml/2006/main">
+  <p:cSld>
+    <p:spTree>
+      <p:nvGrpSpPr>
+        <p:cNvPr id="1" name=""/>
+        <p:cNvGrpSpPr/>
+        <p:nvPr/>
+      </p:nvGrpSpPr>
+      <p:grpSpPr>
+        <a:xfrm>
+          <a:off x="0" y="0"/>
+          <a:ext cx="0" cy="0"/>
+          <a:chOff x="0" y="0"/>
+          <a:chExt cx="0" cy="0"/>
+        </a:xfrm>
+      </p:grpSpPr>
+      <p:sp>
+        <p:nvSpPr>
+          <p:cNvPr id="2" name="Title 1">
+            <a:extLst>
+              <a:ext uri="{FF2B5EF4-FFF2-40B4-BE49-F238E27FC236}">
+                <a16:creationId xmlns:a16="http://schemas.microsoft.com/office/drawing/2014/main" id="{BBC13C8D-53C7-4C44-A728-037A4DE67F4B}"/>
+              </a:ext>
+            </a:extLst>
+          </p:cNvPr>
+          <p:cNvSpPr>
+            <a:spLocks noGrp="1"/>
+          </p:cNvSpPr>
+          <p:nvPr>
+            <p:ph type="title"/>
+          </p:nvPr>
+        </p:nvSpPr>
+        <p:spPr>
+          <a:xfrm>
+            <a:off x="162339" y="2578238"/>
+            <a:ext cx="5933661" cy="1325563"/>
+          </a:xfrm>
+        </p:spPr>
+        <p:txBody>
+          <a:bodyPr>
+            <a:normAutofit fontScale="90000"/>
+          </a:bodyPr>
+          <a:lstStyle/>
+          <a:p>
+            <a:r>
+              <a:rPr lang="en-CH" dirty="0"/>
+              <a:t>An example of a 10s ECG window and an extracted beat from it.</a:t>
+            </a:r>
+          </a:p>
+        </p:txBody>
+      </p:sp>
+      <p:pic>
+        <p:nvPicPr>
+          <p:cNvPr id="4" name="Picture 3" descr="A close up of a logo&#10;&#10;Description automatically generated">
+            <a:extLst>
+              <a:ext uri="{FF2B5EF4-FFF2-40B4-BE49-F238E27FC236}">
+                <a16:creationId xmlns:a16="http://schemas.microsoft.com/office/drawing/2014/main" id="{E9D1C522-6FFE-6844-A5B5-D104493E18FB}"/>
+              </a:ext>
+            </a:extLst>
+          </p:cNvPr>
+          <p:cNvPicPr/>
+          <p:nvPr/>
+        </p:nvPicPr>
+        <p:blipFill>
+          <a:blip r:embed="rId2">
+            <a:extLst>
+              <a:ext uri="{28A0092B-C50C-407E-A947-70E740481C1C}">
+                <a14:useLocalDpi xmlns:a14="http://schemas.microsoft.com/office/drawing/2010/main" val="0"/>
+              </a:ext>
+            </a:extLst>
+          </a:blip>
+          <a:stretch>
+            <a:fillRect/>
+          </a:stretch>
+        </p:blipFill>
+        <p:spPr>
+          <a:xfrm>
+            <a:off x="6096001" y="0"/>
+            <a:ext cx="5257799" cy="6857999"/>
+          </a:xfrm>
+          <a:prstGeom prst="rect">
+            <a:avLst/>
+          </a:prstGeom>
+        </p:spPr>
+      </p:pic>
+    </p:spTree>
+    <p:extLst>
+      <p:ext uri="{BB962C8B-B14F-4D97-AF65-F5344CB8AC3E}">
+        <p14:creationId xmlns:p14="http://schemas.microsoft.com/office/powerpoint/2010/main" val="446433469"/>
+      </p:ext>
+    </p:extLst>
+  </p:cSld>
+  <p:clrMapOvr>
+    <a:masterClrMapping/>
+  </p:clrMapOvr>
+</p:sld>
+</file>
+
+<file path=ppt/slides/slide17.xml><?xml version="1.0" encoding="utf-8"?>
+<p:sld xmlns:a="http://schemas.openxmlformats.org/drawingml/2006/main" xmlns:r="http://schemas.openxmlformats.org/officeDocument/2006/relationships" xmlns:p="http://schemas.openxmlformats.org/presentationml/2006/main">
+  <p:cSld>
+    <p:spTree>
+      <p:nvGrpSpPr>
+        <p:cNvPr id="1" name=""/>
+        <p:cNvGrpSpPr/>
+        <p:nvPr/>
+      </p:nvGrpSpPr>
+      <p:grpSpPr>
+        <a:xfrm>
+          <a:off x="0" y="0"/>
+          <a:ext cx="0" cy="0"/>
+          <a:chOff x="0" y="0"/>
+          <a:chExt cx="0" cy="0"/>
+        </a:xfrm>
+      </p:grpSpPr>
+      <p:sp>
+        <p:nvSpPr>
+          <p:cNvPr id="2" name="Title 1">
+            <a:extLst>
+              <a:ext uri="{FF2B5EF4-FFF2-40B4-BE49-F238E27FC236}">
+                <a16:creationId xmlns:a16="http://schemas.microsoft.com/office/drawing/2014/main" id="{EDFA42DC-A83C-6244-ACB0-DB76CDC42B5A}"/>
+              </a:ext>
+            </a:extLst>
+          </p:cNvPr>
+          <p:cNvSpPr>
+            <a:spLocks noGrp="1"/>
+          </p:cNvSpPr>
+          <p:nvPr>
+            <p:ph type="title"/>
+          </p:nvPr>
+        </p:nvSpPr>
+        <p:spPr/>
+        <p:txBody>
+          <a:bodyPr/>
+          <a:lstStyle/>
+          <a:p>
+            <a:r>
+              <a:rPr lang="en-CH" dirty="0"/>
+              <a:t>My Signal Preprocessing Modifications</a:t>
+            </a:r>
+          </a:p>
+        </p:txBody>
+      </p:sp>
+      <p:sp>
+        <p:nvSpPr>
+          <p:cNvPr id="3" name="Content Placeholder 2">
+            <a:extLst>
+              <a:ext uri="{FF2B5EF4-FFF2-40B4-BE49-F238E27FC236}">
+                <a16:creationId xmlns:a16="http://schemas.microsoft.com/office/drawing/2014/main" id="{79A36AC7-A53F-9643-86E9-9737FFA38AEE}"/>
+              </a:ext>
+            </a:extLst>
+          </p:cNvPr>
+          <p:cNvSpPr>
+            <a:spLocks noGrp="1"/>
+          </p:cNvSpPr>
+          <p:nvPr>
+            <p:ph idx="1"/>
+          </p:nvPr>
+        </p:nvSpPr>
+        <p:spPr>
+          <a:xfrm>
+            <a:off x="838200" y="2505104"/>
+            <a:ext cx="10515600" cy="2892149"/>
+          </a:xfrm>
+        </p:spPr>
+        <p:txBody>
+          <a:bodyPr>
+            <a:normAutofit/>
+          </a:bodyPr>
+          <a:lstStyle/>
+          <a:p>
+            <a:r>
+              <a:rPr lang="en-CH" dirty="0"/>
+              <a:t>Fixed T = 100 (Hyperparameter)</a:t>
+            </a:r>
+          </a:p>
+          <a:p>
+            <a:r>
+              <a:rPr lang="en-CH" dirty="0"/>
+              <a:t>Chose Beat Fixed Length = 188</a:t>
+            </a:r>
+          </a:p>
+          <a:p>
+            <a:pPr lvl="1"/>
+            <a:r>
+              <a:rPr lang="en-CH" dirty="0"/>
+              <a:t>This is the length used by the training dataset*</a:t>
+            </a:r>
+          </a:p>
+        </p:txBody>
+      </p:sp>
+      <p:sp>
+        <p:nvSpPr>
+          <p:cNvPr id="4" name="TextBox 3">
+            <a:extLst>
+              <a:ext uri="{FF2B5EF4-FFF2-40B4-BE49-F238E27FC236}">
+                <a16:creationId xmlns:a16="http://schemas.microsoft.com/office/drawing/2014/main" id="{DE4B8189-D714-DE46-9A6B-C900C1DA689B}"/>
+              </a:ext>
+            </a:extLst>
+          </p:cNvPr>
+          <p:cNvSpPr txBox="1"/>
+          <p:nvPr/>
+        </p:nvSpPr>
+        <p:spPr>
+          <a:xfrm>
+            <a:off x="0" y="6211669"/>
+            <a:ext cx="8229600" cy="646331"/>
+          </a:xfrm>
+          <a:prstGeom prst="rect">
+            <a:avLst/>
+          </a:prstGeom>
+          <a:noFill/>
+        </p:spPr>
+        <p:txBody>
+          <a:bodyPr wrap="square" rtlCol="0">
+            <a:spAutoFit/>
+          </a:bodyPr>
+          <a:lstStyle/>
+          <a:p>
+            <a:r>
+              <a:rPr lang="en-CH" dirty="0"/>
+              <a:t>*[5]</a:t>
+            </a:r>
+            <a:r>
+              <a:rPr lang="en-CH" b="1" dirty="0"/>
+              <a:t> ECG Heartbeat Categorization Dataset</a:t>
+            </a:r>
+            <a:endParaRPr lang="en-CH" dirty="0"/>
+          </a:p>
+          <a:p>
+            <a:r>
+              <a:rPr lang="en-CH" u="sng" dirty="0"/>
+              <a:t>https://www.kaggle.com/shayanfazeli/heartbeat</a:t>
+            </a:r>
+            <a:endParaRPr lang="en-CH" dirty="0"/>
+          </a:p>
+        </p:txBody>
+      </p:sp>
+    </p:spTree>
+    <p:extLst>
+      <p:ext uri="{BB962C8B-B14F-4D97-AF65-F5344CB8AC3E}">
+        <p14:creationId xmlns:p14="http://schemas.microsoft.com/office/powerpoint/2010/main" val="3865361051"/>
+      </p:ext>
+    </p:extLst>
+  </p:cSld>
+  <p:clrMapOvr>
+    <a:masterClrMapping/>
+  </p:clrMapOvr>
+</p:sld>
+</file>
+
+<file path=ppt/slides/slide18.xml><?xml version="1.0" encoding="utf-8"?>
 <p:sld xmlns:a="http://schemas.openxmlformats.org/drawingml/2006/main" xmlns:r="http://schemas.openxmlformats.org/officeDocument/2006/relationships" xmlns:p="http://schemas.openxmlformats.org/presentationml/2006/main">
   <p:cSld>
     <p:bg>
@@ -4669,7 +5142,7 @@
 </p:sld>
 </file>
 
-<file path=ppt/slides/slide16.xml><?xml version="1.0" encoding="utf-8"?>
+<file path=ppt/slides/slide19.xml><?xml version="1.0" encoding="utf-8"?>
 <p:sld xmlns:a="http://schemas.openxmlformats.org/drawingml/2006/main" xmlns:r="http://schemas.openxmlformats.org/officeDocument/2006/relationships" xmlns:p="http://schemas.openxmlformats.org/presentationml/2006/main">
   <p:cSld>
     <p:bg>
@@ -4844,7 +5317,126 @@
 </p:sld>
 </file>
 
-<file path=ppt/slides/slide17.xml><?xml version="1.0" encoding="utf-8"?>
+<file path=ppt/slides/slide2.xml><?xml version="1.0" encoding="utf-8"?>
+<p:sld xmlns:a="http://schemas.openxmlformats.org/drawingml/2006/main" xmlns:r="http://schemas.openxmlformats.org/officeDocument/2006/relationships" xmlns:p="http://schemas.openxmlformats.org/presentationml/2006/main">
+  <p:cSld>
+    <p:spTree>
+      <p:nvGrpSpPr>
+        <p:cNvPr id="1" name=""/>
+        <p:cNvGrpSpPr/>
+        <p:nvPr/>
+      </p:nvGrpSpPr>
+      <p:grpSpPr>
+        <a:xfrm>
+          <a:off x="0" y="0"/>
+          <a:ext cx="0" cy="0"/>
+          <a:chOff x="0" y="0"/>
+          <a:chExt cx="0" cy="0"/>
+        </a:xfrm>
+      </p:grpSpPr>
+      <p:sp>
+        <p:nvSpPr>
+          <p:cNvPr id="2" name="Title 1">
+            <a:extLst>
+              <a:ext uri="{FF2B5EF4-FFF2-40B4-BE49-F238E27FC236}">
+                <a16:creationId xmlns:a16="http://schemas.microsoft.com/office/drawing/2014/main" id="{D024667A-6AE0-DE4C-8741-DB292805FC18}"/>
+              </a:ext>
+            </a:extLst>
+          </p:cNvPr>
+          <p:cNvSpPr>
+            <a:spLocks noGrp="1"/>
+          </p:cNvSpPr>
+          <p:nvPr>
+            <p:ph type="title"/>
+          </p:nvPr>
+        </p:nvSpPr>
+        <p:spPr/>
+        <p:txBody>
+          <a:bodyPr/>
+          <a:lstStyle/>
+          <a:p>
+            <a:r>
+              <a:rPr lang="en-GB" dirty="0">
+                <a:cs typeface="Times New Roman" panose="02020603050405020304" pitchFamily="18" charset="0"/>
+              </a:rPr>
+              <a:t>Motivation</a:t>
+            </a:r>
+            <a:endParaRPr lang="en-CH" dirty="0"/>
+          </a:p>
+        </p:txBody>
+      </p:sp>
+      <p:sp>
+        <p:nvSpPr>
+          <p:cNvPr id="3" name="Content Placeholder 2">
+            <a:extLst>
+              <a:ext uri="{FF2B5EF4-FFF2-40B4-BE49-F238E27FC236}">
+                <a16:creationId xmlns:a16="http://schemas.microsoft.com/office/drawing/2014/main" id="{4A34A74D-34E1-3445-8817-AC4A9145E576}"/>
+              </a:ext>
+            </a:extLst>
+          </p:cNvPr>
+          <p:cNvSpPr>
+            <a:spLocks noGrp="1"/>
+          </p:cNvSpPr>
+          <p:nvPr>
+            <p:ph idx="1"/>
+          </p:nvPr>
+        </p:nvSpPr>
+        <p:spPr/>
+        <p:txBody>
+          <a:bodyPr>
+            <a:normAutofit lnSpcReduction="10000"/>
+          </a:bodyPr>
+          <a:lstStyle/>
+          <a:p>
+            <a:r>
+              <a:rPr lang="en-GB" dirty="0">
+                <a:cs typeface="Times New Roman" panose="02020603050405020304" pitchFamily="18" charset="0"/>
+              </a:rPr>
+              <a:t>Embedded Systems are found everywhere, and you might even be interacting with some of them without even noticing that it is one. This is due to their large field of applications such as cars (ABS systems and others), Point-Of-Sale systems, anti-focus cameras, avionic systems, etc.... and this is just to name a few. </a:t>
+            </a:r>
+          </a:p>
+          <a:p>
+            <a:r>
+              <a:rPr lang="en-GB" dirty="0">
+                <a:cs typeface="Times New Roman" panose="02020603050405020304" pitchFamily="18" charset="0"/>
+              </a:rPr>
+              <a:t>Embedded Systems are usually cheap as they are often part of a bigger system that should be cheap. This implies that embedded systems are accessible for anyone.</a:t>
+            </a:r>
+            <a:br>
+              <a:rPr lang="en-GB" dirty="0">
+                <a:cs typeface="Times New Roman" panose="02020603050405020304" pitchFamily="18" charset="0"/>
+              </a:rPr>
+            </a:br>
+            <a:r>
+              <a:rPr lang="en-GB" dirty="0">
+                <a:cs typeface="Times New Roman" panose="02020603050405020304" pitchFamily="18" charset="0"/>
+              </a:rPr>
+              <a:t>Recently, embedded systems begun to support the implementation of Artificial Intelligence (we will discuss this later). Some of these microcontrollers are, of course, the STM32 family. </a:t>
+            </a:r>
+            <a:endParaRPr lang="en-CH" dirty="0"/>
+          </a:p>
+          <a:p>
+            <a:pPr marL="0" indent="0">
+              <a:buNone/>
+            </a:pPr>
+            <a:endParaRPr lang="en-CH" sz="2000" dirty="0"/>
+          </a:p>
+        </p:txBody>
+      </p:sp>
+    </p:spTree>
+    <p:extLst>
+      <p:ext uri="{BB962C8B-B14F-4D97-AF65-F5344CB8AC3E}">
+        <p14:creationId xmlns:p14="http://schemas.microsoft.com/office/powerpoint/2010/main" val="1524940494"/>
+      </p:ext>
+    </p:extLst>
+  </p:cSld>
+  <p:clrMapOvr>
+    <a:masterClrMapping/>
+  </p:clrMapOvr>
+</p:sld>
+</file>
+
+<file path=ppt/slides/slide20.xml><?xml version="1.0" encoding="utf-8"?>
 <p:sld xmlns:a="http://schemas.openxmlformats.org/drawingml/2006/main" xmlns:r="http://schemas.openxmlformats.org/officeDocument/2006/relationships" xmlns:p="http://schemas.openxmlformats.org/presentationml/2006/main">
   <p:cSld>
     <p:spTree>
@@ -5016,7 +5608,7 @@
 </p:sld>
 </file>
 
-<file path=ppt/slides/slide18.xml><?xml version="1.0" encoding="utf-8"?>
+<file path=ppt/slides/slide21.xml><?xml version="1.0" encoding="utf-8"?>
 <p:sld xmlns:a="http://schemas.openxmlformats.org/drawingml/2006/main" xmlns:r="http://schemas.openxmlformats.org/officeDocument/2006/relationships" xmlns:p="http://schemas.openxmlformats.org/presentationml/2006/main">
   <p:cSld>
     <p:spTree>
@@ -5132,7 +5724,7 @@
 </p:sld>
 </file>
 
-<file path=ppt/slides/slide19.xml><?xml version="1.0" encoding="utf-8"?>
+<file path=ppt/slides/slide22.xml><?xml version="1.0" encoding="utf-8"?>
 <p:sld xmlns:a="http://schemas.openxmlformats.org/drawingml/2006/main" xmlns:r="http://schemas.openxmlformats.org/officeDocument/2006/relationships" xmlns:p="http://schemas.openxmlformats.org/presentationml/2006/main">
   <p:cSld>
     <p:spTree>
@@ -5254,7 +5846,7 @@
 </p:sld>
 </file>
 
-<file path=ppt/slides/slide2.xml><?xml version="1.0" encoding="utf-8"?>
+<file path=ppt/slides/slide23.xml><?xml version="1.0" encoding="utf-8"?>
 <p:sld xmlns:a="http://schemas.openxmlformats.org/drawingml/2006/main" xmlns:r="http://schemas.openxmlformats.org/officeDocument/2006/relationships" xmlns:p="http://schemas.openxmlformats.org/presentationml/2006/main">
   <p:cSld>
     <p:spTree>
@@ -5276,125 +5868,6 @@
           <p:cNvPr id="2" name="Title 1">
             <a:extLst>
               <a:ext uri="{FF2B5EF4-FFF2-40B4-BE49-F238E27FC236}">
-                <a16:creationId xmlns:a16="http://schemas.microsoft.com/office/drawing/2014/main" id="{D024667A-6AE0-DE4C-8741-DB292805FC18}"/>
-              </a:ext>
-            </a:extLst>
-          </p:cNvPr>
-          <p:cNvSpPr>
-            <a:spLocks noGrp="1"/>
-          </p:cNvSpPr>
-          <p:nvPr>
-            <p:ph type="title"/>
-          </p:nvPr>
-        </p:nvSpPr>
-        <p:spPr/>
-        <p:txBody>
-          <a:bodyPr/>
-          <a:lstStyle/>
-          <a:p>
-            <a:r>
-              <a:rPr lang="en-GB" dirty="0">
-                <a:cs typeface="Times New Roman" panose="02020603050405020304" pitchFamily="18" charset="0"/>
-              </a:rPr>
-              <a:t>Motivation</a:t>
-            </a:r>
-            <a:endParaRPr lang="en-CH" dirty="0"/>
-          </a:p>
-        </p:txBody>
-      </p:sp>
-      <p:sp>
-        <p:nvSpPr>
-          <p:cNvPr id="3" name="Content Placeholder 2">
-            <a:extLst>
-              <a:ext uri="{FF2B5EF4-FFF2-40B4-BE49-F238E27FC236}">
-                <a16:creationId xmlns:a16="http://schemas.microsoft.com/office/drawing/2014/main" id="{4A34A74D-34E1-3445-8817-AC4A9145E576}"/>
-              </a:ext>
-            </a:extLst>
-          </p:cNvPr>
-          <p:cNvSpPr>
-            <a:spLocks noGrp="1"/>
-          </p:cNvSpPr>
-          <p:nvPr>
-            <p:ph idx="1"/>
-          </p:nvPr>
-        </p:nvSpPr>
-        <p:spPr/>
-        <p:txBody>
-          <a:bodyPr>
-            <a:normAutofit lnSpcReduction="10000"/>
-          </a:bodyPr>
-          <a:lstStyle/>
-          <a:p>
-            <a:r>
-              <a:rPr lang="en-GB" dirty="0">
-                <a:cs typeface="Times New Roman" panose="02020603050405020304" pitchFamily="18" charset="0"/>
-              </a:rPr>
-              <a:t>Embedded Systems are found everywhere, and you might even be interacting with some of them without even noticing that it is one. This is due to their large field of applications such as cars (ABS systems and others), Point-Of-Sale systems, anti-focus cameras, avionic systems, etc.... and this is just to name a few. </a:t>
-            </a:r>
-          </a:p>
-          <a:p>
-            <a:r>
-              <a:rPr lang="en-GB" dirty="0">
-                <a:cs typeface="Times New Roman" panose="02020603050405020304" pitchFamily="18" charset="0"/>
-              </a:rPr>
-              <a:t>Embedded Systems are usually cheap as they are often part of a bigger system that should be cheap. This implies that embedded systems are accessible for anyone.</a:t>
-            </a:r>
-            <a:br>
-              <a:rPr lang="en-GB" dirty="0">
-                <a:cs typeface="Times New Roman" panose="02020603050405020304" pitchFamily="18" charset="0"/>
-              </a:rPr>
-            </a:br>
-            <a:r>
-              <a:rPr lang="en-GB" dirty="0">
-                <a:cs typeface="Times New Roman" panose="02020603050405020304" pitchFamily="18" charset="0"/>
-              </a:rPr>
-              <a:t>Recently, embedded systems begun to support the implementation of Artificial Intelligence (we will discuss this later). Some of these microcontrollers are, of course, the STM32 family. </a:t>
-            </a:r>
-            <a:endParaRPr lang="en-CH" dirty="0"/>
-          </a:p>
-          <a:p>
-            <a:pPr marL="0" indent="0">
-              <a:buNone/>
-            </a:pPr>
-            <a:endParaRPr lang="en-CH" sz="2000" dirty="0"/>
-          </a:p>
-        </p:txBody>
-      </p:sp>
-    </p:spTree>
-    <p:extLst>
-      <p:ext uri="{BB962C8B-B14F-4D97-AF65-F5344CB8AC3E}">
-        <p14:creationId xmlns:p14="http://schemas.microsoft.com/office/powerpoint/2010/main" val="1524940494"/>
-      </p:ext>
-    </p:extLst>
-  </p:cSld>
-  <p:clrMapOvr>
-    <a:masterClrMapping/>
-  </p:clrMapOvr>
-</p:sld>
-</file>
-
-<file path=ppt/slides/slide20.xml><?xml version="1.0" encoding="utf-8"?>
-<p:sld xmlns:a="http://schemas.openxmlformats.org/drawingml/2006/main" xmlns:r="http://schemas.openxmlformats.org/officeDocument/2006/relationships" xmlns:p="http://schemas.openxmlformats.org/presentationml/2006/main">
-  <p:cSld>
-    <p:spTree>
-      <p:nvGrpSpPr>
-        <p:cNvPr id="1" name=""/>
-        <p:cNvGrpSpPr/>
-        <p:nvPr/>
-      </p:nvGrpSpPr>
-      <p:grpSpPr>
-        <a:xfrm>
-          <a:off x="0" y="0"/>
-          <a:ext cx="0" cy="0"/>
-          <a:chOff x="0" y="0"/>
-          <a:chExt cx="0" cy="0"/>
-        </a:xfrm>
-      </p:grpSpPr>
-      <p:sp>
-        <p:nvSpPr>
-          <p:cNvPr id="2" name="Title 1">
-            <a:extLst>
-              <a:ext uri="{FF2B5EF4-FFF2-40B4-BE49-F238E27FC236}">
                 <a16:creationId xmlns:a16="http://schemas.microsoft.com/office/drawing/2014/main" id="{94069945-F8E0-8940-BDDF-6E94B0F10AE6}"/>
               </a:ext>
             </a:extLst>
@@ -5434,113 +5907,278 @@
             <p:ph idx="1"/>
           </p:nvPr>
         </p:nvSpPr>
-        <p:spPr/>
-        <p:txBody>
-          <a:bodyPr/>
-          <a:lstStyle/>
-          <a:p>
-            <a:r>
-              <a:rPr lang="en-GB" b="1" dirty="0"/>
-              <a:t>ECG Heartbeat Classification: A Deep Transferable Representation. </a:t>
-            </a:r>
-            <a:r>
-              <a:rPr lang="en-GB" dirty="0"/>
-              <a:t>By </a:t>
-            </a:r>
-            <a:r>
-              <a:rPr lang="en-GB" dirty="0">
+        <p:spPr>
+          <a:xfrm>
+            <a:off x="838200" y="1825625"/>
+            <a:ext cx="10515600" cy="4522166"/>
+          </a:xfrm>
+        </p:spPr>
+        <p:txBody>
+          <a:bodyPr>
+            <a:normAutofit fontScale="55000" lnSpcReduction="20000"/>
+          </a:bodyPr>
+          <a:lstStyle/>
+          <a:p>
+            <a:pPr marL="0" indent="0">
+              <a:buNone/>
+            </a:pPr>
+            <a:r>
+              <a:rPr lang="en-US" sz="2900" dirty="0"/>
+              <a:t>[1] </a:t>
+            </a:r>
+            <a:r>
+              <a:rPr lang="en-CH" sz="2900" b="1" dirty="0"/>
+              <a:t>ECG Heartbeat Classification: A Deep Transferable Representation</a:t>
+            </a:r>
+            <a:r>
+              <a:rPr lang="en-US" sz="2900" b="1" dirty="0"/>
+              <a:t>, by </a:t>
+            </a:r>
+            <a:r>
+              <a:rPr lang="en-CH" sz="2900" b="1" u="sng" dirty="0">
                 <a:hlinkClick r:id="rId2"/>
               </a:rPr>
               <a:t>Mohammad Kachuee</a:t>
             </a:r>
             <a:r>
-              <a:rPr lang="en-GB" dirty="0"/>
+              <a:rPr lang="en-CH" sz="2900" b="1" dirty="0"/>
               <a:t>, </a:t>
             </a:r>
             <a:r>
-              <a:rPr lang="en-GB" dirty="0">
+              <a:rPr lang="en-CH" sz="2900" b="1" u="sng" dirty="0">
                 <a:hlinkClick r:id="rId3"/>
               </a:rPr>
-              <a:t>Shayan Fazeli</a:t>
-            </a:r>
-            <a:r>
-              <a:rPr lang="en-GB" dirty="0"/>
+              <a:t>Shayan</a:t>
+            </a:r>
+            <a:r>
+              <a:rPr lang="en-CH" sz="2900" b="1" u="sng" dirty="0">
+                <a:hlinkClick r:id="rId3"/>
+              </a:rPr>
+              <a:t> </a:t>
+            </a:r>
+            <a:r>
+              <a:rPr lang="en-CH" sz="2900" b="1" u="sng" dirty="0">
+                <a:hlinkClick r:id="rId3"/>
+              </a:rPr>
+              <a:t>Fazeli</a:t>
+            </a:r>
+            <a:r>
+              <a:rPr lang="en-CH" sz="2900" b="1" dirty="0"/>
               <a:t>, </a:t>
             </a:r>
             <a:r>
-              <a:rPr lang="en-GB" dirty="0">
+              <a:rPr lang="en-CH" sz="2900" b="1" u="sng" dirty="0">
                 <a:hlinkClick r:id="rId4"/>
               </a:rPr>
               <a:t>Majid Sarrafzadeh</a:t>
             </a:r>
-            <a:endParaRPr lang="en-GB" dirty="0"/>
+            <a:endParaRPr lang="en-CH" sz="2900" dirty="0"/>
           </a:p>
           <a:p>
             <a:pPr marL="0" indent="0">
               <a:buNone/>
             </a:pPr>
             <a:r>
-              <a:rPr lang="en-GB" dirty="0"/>
-              <a:t>   </a:t>
-            </a:r>
-            <a:r>
-              <a:rPr lang="en-GB" dirty="0">
+              <a:rPr lang="en-CH" sz="2900" u="sng" dirty="0">
                 <a:hlinkClick r:id="rId5"/>
               </a:rPr>
               <a:t>https://arxiv.org/abs/1805.00794</a:t>
             </a:r>
-            <a:endParaRPr lang="en-GB" dirty="0"/>
-          </a:p>
-          <a:p>
-            <a:r>
-              <a:rPr lang="en-GB" b="1" dirty="0"/>
-              <a:t>Heartbeat Dataset</a:t>
-            </a:r>
+            <a:endParaRPr lang="en-CH" sz="2900" dirty="0"/>
           </a:p>
           <a:p>
             <a:pPr marL="0" indent="0">
               <a:buNone/>
             </a:pPr>
             <a:r>
-              <a:rPr lang="en-GB" dirty="0">
+              <a:rPr lang="en-CH" sz="2900" dirty="0"/>
+              <a:t> </a:t>
+            </a:r>
+          </a:p>
+          <a:p>
+            <a:pPr marL="0" indent="0">
+              <a:buNone/>
+            </a:pPr>
+            <a:r>
+              <a:rPr lang="en-CH" sz="2900" dirty="0"/>
+              <a:t>[2] </a:t>
+            </a:r>
+            <a:r>
+              <a:rPr lang="en-CH" sz="2900" b="1" dirty="0"/>
+              <a:t>TinyML</a:t>
+            </a:r>
+            <a:r>
+              <a:rPr lang="en-CH" sz="2900" dirty="0"/>
+              <a:t>, by </a:t>
+            </a:r>
+            <a:r>
+              <a:rPr lang="en-CH" sz="2900" u="sng" dirty="0">
                 <a:hlinkClick r:id="rId6"/>
               </a:rPr>
-              <a:t>https://www.kaggle.com/shayanfazeli/heartbeat</a:t>
-            </a:r>
-            <a:endParaRPr lang="en-GB" dirty="0"/>
-          </a:p>
-          <a:p>
-            <a:r>
-              <a:rPr lang="en-GB" b="1" dirty="0" err="1"/>
-              <a:t>Tensorflow</a:t>
-            </a:r>
-            <a:r>
-              <a:rPr lang="en-GB" b="1" dirty="0"/>
-              <a:t> Lite</a:t>
-            </a:r>
-          </a:p>
-          <a:p>
-            <a:pPr marL="0" indent="0">
-              <a:buNone/>
-            </a:pPr>
-            <a:r>
-              <a:rPr lang="en-GB" dirty="0">
+              <a:t>Pete Warden</a:t>
+            </a:r>
+            <a:r>
+              <a:rPr lang="en-CH" sz="2900" dirty="0"/>
+              <a:t>, </a:t>
+            </a:r>
+            <a:r>
+              <a:rPr lang="en-CH" sz="2900" u="sng" dirty="0">
                 <a:hlinkClick r:id="rId7"/>
               </a:rPr>
+              <a:t>Daniel Situnayake</a:t>
+            </a:r>
+            <a:r>
+              <a:rPr lang="en-CH" sz="2900" dirty="0"/>
+              <a:t>, ISBN: 9781492052043.</a:t>
+            </a:r>
+          </a:p>
+          <a:p>
+            <a:pPr marL="0" indent="0">
+              <a:buNone/>
+            </a:pPr>
+            <a:r>
+              <a:rPr lang="en-CH" sz="2900" u="sng" dirty="0">
+                <a:hlinkClick r:id="rId8"/>
+              </a:rPr>
+              <a:t>https://learning.oreilly.com/library/view/tinyml/9781492052036/</a:t>
+            </a:r>
+            <a:endParaRPr lang="en-CH" sz="2900" dirty="0"/>
+          </a:p>
+          <a:p>
+            <a:pPr marL="0" indent="0">
+              <a:buNone/>
+            </a:pPr>
+            <a:r>
+              <a:rPr lang="en-CH" sz="2900" dirty="0"/>
+              <a:t> </a:t>
+            </a:r>
+          </a:p>
+          <a:p>
+            <a:pPr marL="0" indent="0">
+              <a:buNone/>
+            </a:pPr>
+            <a:r>
+              <a:rPr lang="en-CH" sz="2900" dirty="0"/>
+              <a:t>[3] </a:t>
+            </a:r>
+            <a:r>
+              <a:rPr lang="en-CH" sz="2900" b="1" dirty="0"/>
+              <a:t>Tensorflow Lite documentation</a:t>
+            </a:r>
+            <a:r>
+              <a:rPr lang="en-CH" sz="2900" dirty="0"/>
+              <a:t>.</a:t>
+            </a:r>
+          </a:p>
+          <a:p>
+            <a:pPr marL="0" indent="0">
+              <a:buNone/>
+            </a:pPr>
+            <a:r>
+              <a:rPr lang="en-CH" sz="2900" u="sng" dirty="0">
+                <a:hlinkClick r:id="rId9"/>
+              </a:rPr>
               <a:t>https://www.tensorflow.org/lite</a:t>
             </a:r>
-            <a:endParaRPr lang="en-GB" dirty="0"/>
-          </a:p>
-          <a:p>
-            <a:r>
-              <a:rPr lang="en-GB" b="1" dirty="0" err="1"/>
-              <a:t>TinyML</a:t>
-            </a:r>
-            <a:r>
-              <a:rPr lang="en-GB" b="1" dirty="0"/>
-              <a:t>, O’Reilly</a:t>
-            </a:r>
-            <a:endParaRPr lang="en-GB" dirty="0"/>
+            <a:endParaRPr lang="en-CH" sz="2900" dirty="0"/>
+          </a:p>
+          <a:p>
+            <a:pPr marL="0" indent="0">
+              <a:buNone/>
+            </a:pPr>
+            <a:r>
+              <a:rPr lang="en-CH" sz="2900" dirty="0"/>
+              <a:t> </a:t>
+            </a:r>
+          </a:p>
+          <a:p>
+            <a:pPr marL="0" indent="0">
+              <a:buNone/>
+            </a:pPr>
+            <a:r>
+              <a:rPr lang="en-CH" sz="2900" dirty="0"/>
+              <a:t>[</a:t>
+            </a:r>
+            <a:r>
+              <a:rPr lang="fr-CH" sz="2900" dirty="0"/>
+              <a:t>4</a:t>
+            </a:r>
+            <a:r>
+              <a:rPr lang="en-CH" sz="2900" dirty="0"/>
+              <a:t>] </a:t>
+            </a:r>
+            <a:r>
+              <a:rPr lang="fr-CH" sz="2900" b="1" dirty="0"/>
+              <a:t>STM32L432KCU </a:t>
+            </a:r>
+            <a:r>
+              <a:rPr lang="fr-CH" sz="2900" b="1" dirty="0" err="1"/>
+              <a:t>Datasheet</a:t>
+            </a:r>
+            <a:endParaRPr lang="en-CH" sz="2900" dirty="0"/>
+          </a:p>
+          <a:p>
+            <a:pPr marL="0" indent="0">
+              <a:buNone/>
+            </a:pPr>
+            <a:r>
+              <a:rPr lang="fr-CH" sz="2900" u="sng" dirty="0"/>
+              <a:t>https://</a:t>
+            </a:r>
+            <a:r>
+              <a:rPr lang="fr-CH" sz="2900" u="sng" dirty="0" err="1"/>
+              <a:t>www.st.com</a:t>
+            </a:r>
+            <a:r>
+              <a:rPr lang="fr-CH" sz="2900" u="sng" dirty="0"/>
+              <a:t>/</a:t>
+            </a:r>
+            <a:r>
+              <a:rPr lang="fr-CH" sz="2900" u="sng" dirty="0" err="1"/>
+              <a:t>resource</a:t>
+            </a:r>
+            <a:r>
+              <a:rPr lang="fr-CH" sz="2900" u="sng" dirty="0"/>
+              <a:t>/en/</a:t>
+            </a:r>
+            <a:r>
+              <a:rPr lang="fr-CH" sz="2900" u="sng" dirty="0" err="1"/>
+              <a:t>datasheet</a:t>
+            </a:r>
+            <a:r>
+              <a:rPr lang="fr-CH" sz="2900" u="sng" dirty="0"/>
+              <a:t>/stm32l432kc.pdf</a:t>
+            </a:r>
+            <a:endParaRPr lang="en-CH" sz="2900" u="sng" dirty="0"/>
+          </a:p>
+          <a:p>
+            <a:pPr marL="0" indent="0">
+              <a:buNone/>
+            </a:pPr>
+            <a:endParaRPr lang="en-CH" sz="2900" dirty="0"/>
+          </a:p>
+          <a:p>
+            <a:pPr marL="0" indent="0">
+              <a:buNone/>
+            </a:pPr>
+            <a:r>
+              <a:rPr lang="en-CH" sz="2900" dirty="0"/>
+              <a:t>[5]</a:t>
+            </a:r>
+            <a:r>
+              <a:rPr lang="en-CH" sz="2900" b="1" dirty="0"/>
+              <a:t> ECG Heartbeat Categorization Dataset</a:t>
+            </a:r>
+            <a:endParaRPr lang="en-CH" sz="2900" dirty="0"/>
+          </a:p>
+          <a:p>
+            <a:pPr marL="0" indent="0">
+              <a:buNone/>
+            </a:pPr>
+            <a:r>
+              <a:rPr lang="en-CH" sz="2900" u="sng" dirty="0"/>
+              <a:t>https://www.kaggle.com/shayanfazeli/heartbeat</a:t>
+            </a:r>
           </a:p>
           <a:p>
             <a:pPr marL="0" indent="0">

</xml_diff>

<commit_message>
Added Documentation and modified report and presentation
</commit_message>
<xml_diff>
--- a/Report_Presentation/Presentation.pptx
+++ b/Report_Presentation/Presentation.pptx
@@ -4873,8 +4873,20 @@
           <a:p>
             <a:r>
               <a:rPr lang="en-CH" dirty="0"/>
-              <a:t>Fixed T = 100 (Hyperparameter)</a:t>
-            </a:r>
+              <a:t>T = 100 or more, </a:t>
+            </a:r>
+            <a:r>
+              <a:rPr lang="en-US" dirty="0"/>
+              <a:t>depending on when a Peak arrives after 100x8=800ms</a:t>
+            </a:r>
+          </a:p>
+          <a:p>
+            <a:pPr lvl="1"/>
+            <a:r>
+              <a:rPr lang="en-US" dirty="0"/>
+              <a:t>Hyperparameter</a:t>
+            </a:r>
+            <a:endParaRPr lang="en-CH" dirty="0"/>
           </a:p>
           <a:p>
             <a:r>
@@ -5948,19 +5960,7 @@
               <a:rPr lang="en-CH" sz="2900" b="1" u="sng" dirty="0">
                 <a:hlinkClick r:id="rId3"/>
               </a:rPr>
-              <a:t>Shayan</a:t>
-            </a:r>
-            <a:r>
-              <a:rPr lang="en-CH" sz="2900" b="1" u="sng" dirty="0">
-                <a:hlinkClick r:id="rId3"/>
-              </a:rPr>
-              <a:t> </a:t>
-            </a:r>
-            <a:r>
-              <a:rPr lang="en-CH" sz="2900" b="1" u="sng" dirty="0">
-                <a:hlinkClick r:id="rId3"/>
-              </a:rPr>
-              <a:t>Fazeli</a:t>
+              <a:t>Shayan Fazeli</a:t>
             </a:r>
             <a:r>
               <a:rPr lang="en-CH" sz="2900" b="1" dirty="0"/>

</xml_diff>